<commit_message>
minor reformatting before exporting pdf
</commit_message>
<xml_diff>
--- a/talk00-presentation-slides.pptx
+++ b/talk00-presentation-slides.pptx
@@ -4234,7 +4234,7 @@
           <a:p>
             <a:fld id="{CA5C5088-4CC4-9045-BE76-94F9E47B95CD}" type="datetimeFigureOut">
               <a:rPr lang="en-US" smtClean="0"/>
-              <a:t>10/19/24</a:t>
+              <a:t>11/1/24</a:t>
             </a:fld>
             <a:endParaRPr lang="en-US"/>
           </a:p>
@@ -4434,7 +4434,7 @@
           <a:p>
             <a:fld id="{CA5C5088-4CC4-9045-BE76-94F9E47B95CD}" type="datetimeFigureOut">
               <a:rPr lang="en-US" smtClean="0"/>
-              <a:t>10/19/24</a:t>
+              <a:t>11/1/24</a:t>
             </a:fld>
             <a:endParaRPr lang="en-US"/>
           </a:p>
@@ -4644,7 +4644,7 @@
           <a:p>
             <a:fld id="{CA5C5088-4CC4-9045-BE76-94F9E47B95CD}" type="datetimeFigureOut">
               <a:rPr lang="en-US" smtClean="0"/>
-              <a:t>10/19/24</a:t>
+              <a:t>11/1/24</a:t>
             </a:fld>
             <a:endParaRPr lang="en-US"/>
           </a:p>
@@ -4844,7 +4844,7 @@
           <a:p>
             <a:fld id="{CA5C5088-4CC4-9045-BE76-94F9E47B95CD}" type="datetimeFigureOut">
               <a:rPr lang="en-US" smtClean="0"/>
-              <a:t>10/19/24</a:t>
+              <a:t>11/1/24</a:t>
             </a:fld>
             <a:endParaRPr lang="en-US"/>
           </a:p>
@@ -5120,7 +5120,7 @@
           <a:p>
             <a:fld id="{CA5C5088-4CC4-9045-BE76-94F9E47B95CD}" type="datetimeFigureOut">
               <a:rPr lang="en-US" smtClean="0"/>
-              <a:t>10/19/24</a:t>
+              <a:t>11/1/24</a:t>
             </a:fld>
             <a:endParaRPr lang="en-US"/>
           </a:p>
@@ -5388,7 +5388,7 @@
           <a:p>
             <a:fld id="{CA5C5088-4CC4-9045-BE76-94F9E47B95CD}" type="datetimeFigureOut">
               <a:rPr lang="en-US" smtClean="0"/>
-              <a:t>10/19/24</a:t>
+              <a:t>11/1/24</a:t>
             </a:fld>
             <a:endParaRPr lang="en-US"/>
           </a:p>
@@ -5803,7 +5803,7 @@
           <a:p>
             <a:fld id="{CA5C5088-4CC4-9045-BE76-94F9E47B95CD}" type="datetimeFigureOut">
               <a:rPr lang="en-US" smtClean="0"/>
-              <a:t>10/19/24</a:t>
+              <a:t>11/1/24</a:t>
             </a:fld>
             <a:endParaRPr lang="en-US"/>
           </a:p>
@@ -5945,7 +5945,7 @@
           <a:p>
             <a:fld id="{CA5C5088-4CC4-9045-BE76-94F9E47B95CD}" type="datetimeFigureOut">
               <a:rPr lang="en-US" smtClean="0"/>
-              <a:t>10/19/24</a:t>
+              <a:t>11/1/24</a:t>
             </a:fld>
             <a:endParaRPr lang="en-US"/>
           </a:p>
@@ -6058,7 +6058,7 @@
           <a:p>
             <a:fld id="{CA5C5088-4CC4-9045-BE76-94F9E47B95CD}" type="datetimeFigureOut">
               <a:rPr lang="en-US" smtClean="0"/>
-              <a:t>10/19/24</a:t>
+              <a:t>11/1/24</a:t>
             </a:fld>
             <a:endParaRPr lang="en-US"/>
           </a:p>
@@ -6371,7 +6371,7 @@
           <a:p>
             <a:fld id="{CA5C5088-4CC4-9045-BE76-94F9E47B95CD}" type="datetimeFigureOut">
               <a:rPr lang="en-US" smtClean="0"/>
-              <a:t>10/19/24</a:t>
+              <a:t>11/1/24</a:t>
             </a:fld>
             <a:endParaRPr lang="en-US"/>
           </a:p>
@@ -6660,7 +6660,7 @@
           <a:p>
             <a:fld id="{CA5C5088-4CC4-9045-BE76-94F9E47B95CD}" type="datetimeFigureOut">
               <a:rPr lang="en-US" smtClean="0"/>
-              <a:t>10/19/24</a:t>
+              <a:t>11/1/24</a:t>
             </a:fld>
             <a:endParaRPr lang="en-US"/>
           </a:p>
@@ -6903,7 +6903,7 @@
           <a:p>
             <a:fld id="{CA5C5088-4CC4-9045-BE76-94F9E47B95CD}" type="datetimeFigureOut">
               <a:rPr lang="en-US" smtClean="0"/>
-              <a:t>10/19/24</a:t>
+              <a:t>11/1/24</a:t>
             </a:fld>
             <a:endParaRPr lang="en-US"/>
           </a:p>

</xml_diff>